<commit_message>
small change to viz_dataleaks
</commit_message>
<xml_diff>
--- a/paper/figures.pptx
+++ b/paper/figures.pptx
@@ -105,6 +105,11 @@
       </a:defRPr>
     </a:lvl9pPr>
   </p:defaultTextStyle>
+  <p:extLst>
+    <p:ext uri="{EFAFB233-063F-42B5-8137-9DF3F51BA10A}">
+      <p15:sldGuideLst xmlns:p15="http://schemas.microsoft.com/office/powerpoint/2012/main"/>
+    </p:ext>
+  </p:extLst>
 </p:presentation>
 </file>
 
@@ -255,7 +260,7 @@
           <a:p>
             <a:fld id="{57FF86CC-D484-BD46-BF19-DCAB1D818D0B}" type="datetimeFigureOut">
               <a:rPr lang="en-US" smtClean="0"/>
-              <a:t>2/5/24</a:t>
+              <a:t>2/5/2024</a:t>
             </a:fld>
             <a:endParaRPr lang="en-US"/>
           </a:p>
@@ -453,7 +458,7 @@
           <a:p>
             <a:fld id="{57FF86CC-D484-BD46-BF19-DCAB1D818D0B}" type="datetimeFigureOut">
               <a:rPr lang="en-US" smtClean="0"/>
-              <a:t>2/5/24</a:t>
+              <a:t>2/5/2024</a:t>
             </a:fld>
             <a:endParaRPr lang="en-US"/>
           </a:p>
@@ -661,7 +666,7 @@
           <a:p>
             <a:fld id="{57FF86CC-D484-BD46-BF19-DCAB1D818D0B}" type="datetimeFigureOut">
               <a:rPr lang="en-US" smtClean="0"/>
-              <a:t>2/5/24</a:t>
+              <a:t>2/5/2024</a:t>
             </a:fld>
             <a:endParaRPr lang="en-US"/>
           </a:p>
@@ -859,7 +864,7 @@
           <a:p>
             <a:fld id="{57FF86CC-D484-BD46-BF19-DCAB1D818D0B}" type="datetimeFigureOut">
               <a:rPr lang="en-US" smtClean="0"/>
-              <a:t>2/5/24</a:t>
+              <a:t>2/5/2024</a:t>
             </a:fld>
             <a:endParaRPr lang="en-US"/>
           </a:p>
@@ -1134,7 +1139,7 @@
           <a:p>
             <a:fld id="{57FF86CC-D484-BD46-BF19-DCAB1D818D0B}" type="datetimeFigureOut">
               <a:rPr lang="en-US" smtClean="0"/>
-              <a:t>2/5/24</a:t>
+              <a:t>2/5/2024</a:t>
             </a:fld>
             <a:endParaRPr lang="en-US"/>
           </a:p>
@@ -1399,7 +1404,7 @@
           <a:p>
             <a:fld id="{57FF86CC-D484-BD46-BF19-DCAB1D818D0B}" type="datetimeFigureOut">
               <a:rPr lang="en-US" smtClean="0"/>
-              <a:t>2/5/24</a:t>
+              <a:t>2/5/2024</a:t>
             </a:fld>
             <a:endParaRPr lang="en-US"/>
           </a:p>
@@ -1811,7 +1816,7 @@
           <a:p>
             <a:fld id="{57FF86CC-D484-BD46-BF19-DCAB1D818D0B}" type="datetimeFigureOut">
               <a:rPr lang="en-US" smtClean="0"/>
-              <a:t>2/5/24</a:t>
+              <a:t>2/5/2024</a:t>
             </a:fld>
             <a:endParaRPr lang="en-US"/>
           </a:p>
@@ -1952,7 +1957,7 @@
           <a:p>
             <a:fld id="{57FF86CC-D484-BD46-BF19-DCAB1D818D0B}" type="datetimeFigureOut">
               <a:rPr lang="en-US" smtClean="0"/>
-              <a:t>2/5/24</a:t>
+              <a:t>2/5/2024</a:t>
             </a:fld>
             <a:endParaRPr lang="en-US"/>
           </a:p>
@@ -2065,7 +2070,7 @@
           <a:p>
             <a:fld id="{57FF86CC-D484-BD46-BF19-DCAB1D818D0B}" type="datetimeFigureOut">
               <a:rPr lang="en-US" smtClean="0"/>
-              <a:t>2/5/24</a:t>
+              <a:t>2/5/2024</a:t>
             </a:fld>
             <a:endParaRPr lang="en-US"/>
           </a:p>
@@ -2376,7 +2381,7 @@
           <a:p>
             <a:fld id="{57FF86CC-D484-BD46-BF19-DCAB1D818D0B}" type="datetimeFigureOut">
               <a:rPr lang="en-US" smtClean="0"/>
-              <a:t>2/5/24</a:t>
+              <a:t>2/5/2024</a:t>
             </a:fld>
             <a:endParaRPr lang="en-US"/>
           </a:p>
@@ -2664,7 +2669,7 @@
           <a:p>
             <a:fld id="{57FF86CC-D484-BD46-BF19-DCAB1D818D0B}" type="datetimeFigureOut">
               <a:rPr lang="en-US" smtClean="0"/>
-              <a:t>2/5/24</a:t>
+              <a:t>2/5/2024</a:t>
             </a:fld>
             <a:endParaRPr lang="en-US"/>
           </a:p>
@@ -2905,7 +2910,7 @@
           <a:p>
             <a:fld id="{57FF86CC-D484-BD46-BF19-DCAB1D818D0B}" type="datetimeFigureOut">
               <a:rPr lang="en-US" smtClean="0"/>
-              <a:t>2/5/24</a:t>
+              <a:t>2/5/2024</a:t>
             </a:fld>
             <a:endParaRPr lang="en-US"/>
           </a:p>
@@ -3366,16 +3371,15 @@
           </p:cNvPicPr>
           <p:nvPr/>
         </p:nvPicPr>
-        <p:blipFill>
+        <p:blipFill rotWithShape="1">
           <a:blip r:embed="rId3"/>
-          <a:stretch>
-            <a:fillRect/>
-          </a:stretch>
+          <a:srcRect b="94288"/>
+          <a:stretch/>
         </p:blipFill>
         <p:spPr>
           <a:xfrm>
             <a:off x="2969397" y="388308"/>
-            <a:ext cx="3527162" cy="6377878"/>
+            <a:ext cx="3527162" cy="364313"/>
           </a:xfrm>
           <a:prstGeom prst="rect">
             <a:avLst/>
@@ -3403,7 +3407,7 @@
         </p:blipFill>
         <p:spPr>
           <a:xfrm>
-            <a:off x="6650283" y="-15007"/>
+            <a:off x="2875452" y="1121953"/>
             <a:ext cx="3038456" cy="2666566"/>
           </a:xfrm>
           <a:prstGeom prst="rect">
@@ -3433,7 +3437,7 @@
         </p:blipFill>
         <p:spPr>
           <a:xfrm>
-            <a:off x="6096000" y="2666566"/>
+            <a:off x="6349529" y="669338"/>
             <a:ext cx="5934038" cy="1685806"/>
           </a:xfrm>
           <a:prstGeom prst="rect">
@@ -3463,7 +3467,7 @@
         </p:blipFill>
         <p:spPr>
           <a:xfrm>
-            <a:off x="6401993" y="4211179"/>
+            <a:off x="6278094" y="2673513"/>
             <a:ext cx="4610100" cy="2540000"/>
           </a:xfrm>
           <a:prstGeom prst="rect">
@@ -3555,7 +3559,7 @@
         </p:nvSpPr>
         <p:spPr>
           <a:xfrm>
-            <a:off x="6096000" y="2297234"/>
+            <a:off x="6496559" y="129778"/>
             <a:ext cx="1276342" cy="369332"/>
           </a:xfrm>
           <a:prstGeom prst="rect">

</xml_diff>